<commit_message>
Modificaciones a GUI de logín
</commit_message>
<xml_diff>
--- a/Documentación/Sprint 1/Navegación entre interfases e Interfases gráficas de usuario.pptx
+++ b/Documentación/Sprint 1/Navegación entre interfases e Interfases gráficas de usuario.pptx
@@ -105,6 +105,11 @@
       </a:defRPr>
     </a:lvl9pPr>
   </p:defaultTextStyle>
+  <p:extLst>
+    <p:ext uri="{EFAFB233-063F-42B5-8137-9DF3F51BA10A}">
+      <p15:sldGuideLst xmlns:p15="http://schemas.microsoft.com/office/powerpoint/2012/main"/>
+    </p:ext>
+  </p:extLst>
 </p:presentation>
 </file>
 
@@ -257,7 +262,7 @@
           <a:p>
             <a:fld id="{0FC49E1C-D7DA-4603-87F1-F9E3F28E788A}" type="datetimeFigureOut">
               <a:rPr lang="es-CO" smtClean="0"/>
-              <a:t>18/09/2021</a:t>
+              <a:t>20/09/2021</a:t>
             </a:fld>
             <a:endParaRPr lang="es-CO"/>
           </a:p>
@@ -457,7 +462,7 @@
           <a:p>
             <a:fld id="{0FC49E1C-D7DA-4603-87F1-F9E3F28E788A}" type="datetimeFigureOut">
               <a:rPr lang="es-CO" smtClean="0"/>
-              <a:t>18/09/2021</a:t>
+              <a:t>20/09/2021</a:t>
             </a:fld>
             <a:endParaRPr lang="es-CO"/>
           </a:p>
@@ -667,7 +672,7 @@
           <a:p>
             <a:fld id="{0FC49E1C-D7DA-4603-87F1-F9E3F28E788A}" type="datetimeFigureOut">
               <a:rPr lang="es-CO" smtClean="0"/>
-              <a:t>18/09/2021</a:t>
+              <a:t>20/09/2021</a:t>
             </a:fld>
             <a:endParaRPr lang="es-CO"/>
           </a:p>
@@ -867,7 +872,7 @@
           <a:p>
             <a:fld id="{0FC49E1C-D7DA-4603-87F1-F9E3F28E788A}" type="datetimeFigureOut">
               <a:rPr lang="es-CO" smtClean="0"/>
-              <a:t>18/09/2021</a:t>
+              <a:t>20/09/2021</a:t>
             </a:fld>
             <a:endParaRPr lang="es-CO"/>
           </a:p>
@@ -1143,7 +1148,7 @@
           <a:p>
             <a:fld id="{0FC49E1C-D7DA-4603-87F1-F9E3F28E788A}" type="datetimeFigureOut">
               <a:rPr lang="es-CO" smtClean="0"/>
-              <a:t>18/09/2021</a:t>
+              <a:t>20/09/2021</a:t>
             </a:fld>
             <a:endParaRPr lang="es-CO"/>
           </a:p>
@@ -1411,7 +1416,7 @@
           <a:p>
             <a:fld id="{0FC49E1C-D7DA-4603-87F1-F9E3F28E788A}" type="datetimeFigureOut">
               <a:rPr lang="es-CO" smtClean="0"/>
-              <a:t>18/09/2021</a:t>
+              <a:t>20/09/2021</a:t>
             </a:fld>
             <a:endParaRPr lang="es-CO"/>
           </a:p>
@@ -1826,7 +1831,7 @@
           <a:p>
             <a:fld id="{0FC49E1C-D7DA-4603-87F1-F9E3F28E788A}" type="datetimeFigureOut">
               <a:rPr lang="es-CO" smtClean="0"/>
-              <a:t>18/09/2021</a:t>
+              <a:t>20/09/2021</a:t>
             </a:fld>
             <a:endParaRPr lang="es-CO"/>
           </a:p>
@@ -1968,7 +1973,7 @@
           <a:p>
             <a:fld id="{0FC49E1C-D7DA-4603-87F1-F9E3F28E788A}" type="datetimeFigureOut">
               <a:rPr lang="es-CO" smtClean="0"/>
-              <a:t>18/09/2021</a:t>
+              <a:t>20/09/2021</a:t>
             </a:fld>
             <a:endParaRPr lang="es-CO"/>
           </a:p>
@@ -2081,7 +2086,7 @@
           <a:p>
             <a:fld id="{0FC49E1C-D7DA-4603-87F1-F9E3F28E788A}" type="datetimeFigureOut">
               <a:rPr lang="es-CO" smtClean="0"/>
-              <a:t>18/09/2021</a:t>
+              <a:t>20/09/2021</a:t>
             </a:fld>
             <a:endParaRPr lang="es-CO"/>
           </a:p>
@@ -2394,7 +2399,7 @@
           <a:p>
             <a:fld id="{0FC49E1C-D7DA-4603-87F1-F9E3F28E788A}" type="datetimeFigureOut">
               <a:rPr lang="es-CO" smtClean="0"/>
-              <a:t>18/09/2021</a:t>
+              <a:t>20/09/2021</a:t>
             </a:fld>
             <a:endParaRPr lang="es-CO"/>
           </a:p>
@@ -2683,7 +2688,7 @@
           <a:p>
             <a:fld id="{0FC49E1C-D7DA-4603-87F1-F9E3F28E788A}" type="datetimeFigureOut">
               <a:rPr lang="es-CO" smtClean="0"/>
-              <a:t>18/09/2021</a:t>
+              <a:t>20/09/2021</a:t>
             </a:fld>
             <a:endParaRPr lang="es-CO"/>
           </a:p>
@@ -2926,7 +2931,7 @@
           <a:p>
             <a:fld id="{0FC49E1C-D7DA-4603-87F1-F9E3F28E788A}" type="datetimeFigureOut">
               <a:rPr lang="es-CO" smtClean="0"/>
-              <a:t>18/09/2021</a:t>
+              <a:t>20/09/2021</a:t>
             </a:fld>
             <a:endParaRPr lang="es-CO"/>
           </a:p>
@@ -3343,230 +3348,28 @@
           <a:chExt cx="0" cy="0"/>
         </a:xfrm>
       </p:grpSpPr>
-      <p:pic>
-        <p:nvPicPr>
-          <p:cNvPr id="5" name="Imagen 4" descr="Una caricatura de una persona&#10;&#10;Descripción generada automáticamente con confianza baja">
-            <a:extLst>
-              <a:ext uri="{FF2B5EF4-FFF2-40B4-BE49-F238E27FC236}">
-                <a16:creationId xmlns:a16="http://schemas.microsoft.com/office/drawing/2014/main" id="{CBF63FD3-8B8D-48F4-A6D2-BA4DBD9F1457}"/>
-              </a:ext>
-            </a:extLst>
-          </p:cNvPr>
-          <p:cNvPicPr>
-            <a:picLocks noChangeAspect="1"/>
-          </p:cNvPicPr>
+      <p:sp>
+        <p:nvSpPr>
+          <p:cNvPr id="13" name="Rectángulo 12">
+            <a:extLst>
+              <a:ext uri="{FF2B5EF4-FFF2-40B4-BE49-F238E27FC236}">
+                <a16:creationId xmlns:a16="http://schemas.microsoft.com/office/drawing/2014/main" id="{F9A08355-D31A-4980-9D8F-883E7D0A0983}"/>
+              </a:ext>
+            </a:extLst>
+          </p:cNvPr>
+          <p:cNvSpPr/>
           <p:nvPr/>
-        </p:nvPicPr>
-        <p:blipFill>
-          <a:blip r:embed="rId2">
-            <a:extLst>
-              <a:ext uri="{28A0092B-C50C-407E-A947-70E740481C1C}">
-                <a14:useLocalDpi xmlns:a14="http://schemas.microsoft.com/office/drawing/2010/main" val="0"/>
-              </a:ext>
-            </a:extLst>
-          </a:blip>
-          <a:stretch>
-            <a:fillRect/>
-          </a:stretch>
-        </p:blipFill>
+        </p:nvSpPr>
         <p:spPr>
           <a:xfrm>
-            <a:off x="6541475" y="1521117"/>
-            <a:ext cx="5062120" cy="3815765"/>
+            <a:off x="325821" y="830343"/>
+            <a:ext cx="5031398" cy="5707117"/>
           </a:xfrm>
           <a:prstGeom prst="rect">
             <a:avLst/>
           </a:prstGeom>
-        </p:spPr>
-      </p:pic>
-      <p:sp>
-        <p:nvSpPr>
-          <p:cNvPr id="7" name="CuadroTexto 6">
-            <a:extLst>
-              <a:ext uri="{FF2B5EF4-FFF2-40B4-BE49-F238E27FC236}">
-                <a16:creationId xmlns:a16="http://schemas.microsoft.com/office/drawing/2014/main" id="{A36CB4E8-A307-4086-AD5F-D7E812613A7F}"/>
-              </a:ext>
-            </a:extLst>
-          </p:cNvPr>
-          <p:cNvSpPr txBox="1"/>
-          <p:nvPr/>
-        </p:nvSpPr>
-        <p:spPr>
-          <a:xfrm>
-            <a:off x="9785840" y="312575"/>
-            <a:ext cx="1817755" cy="646331"/>
-          </a:xfrm>
-          <a:prstGeom prst="rect">
-            <a:avLst/>
-          </a:prstGeom>
-          <a:noFill/>
-        </p:spPr>
-        <p:txBody>
-          <a:bodyPr wrap="square" rtlCol="0">
-            <a:spAutoFit/>
-          </a:bodyPr>
-          <a:lstStyle/>
-          <a:p>
-            <a:r>
-              <a:rPr lang="es-CO" dirty="0">
-                <a:latin typeface="Berlin Sans FB Demi" panose="020E0802020502020306" pitchFamily="34" charset="0"/>
-              </a:rPr>
-              <a:t>Sobre Nosotros</a:t>
-            </a:r>
-          </a:p>
-          <a:p>
-            <a:endParaRPr lang="es-CO" dirty="0"/>
-          </a:p>
-        </p:txBody>
-      </p:sp>
-      <p:sp>
-        <p:nvSpPr>
-          <p:cNvPr id="8" name="Rectángulo: esquinas redondeadas 7">
-            <a:extLst>
-              <a:ext uri="{FF2B5EF4-FFF2-40B4-BE49-F238E27FC236}">
-                <a16:creationId xmlns:a16="http://schemas.microsoft.com/office/drawing/2014/main" id="{EF316D19-5474-4589-ABD3-159A11F57EFA}"/>
-              </a:ext>
-            </a:extLst>
-          </p:cNvPr>
-          <p:cNvSpPr/>
-          <p:nvPr/>
-        </p:nvSpPr>
-        <p:spPr>
-          <a:xfrm>
-            <a:off x="383930" y="1082017"/>
-            <a:ext cx="5152294" cy="5415497"/>
-          </a:xfrm>
-          <a:prstGeom prst="roundRect">
-            <a:avLst/>
-          </a:prstGeom>
           <a:solidFill>
-            <a:schemeClr val="accent5"/>
-          </a:solidFill>
-        </p:spPr>
-        <p:style>
-          <a:lnRef idx="2">
-            <a:schemeClr val="accent1">
-              <a:shade val="50000"/>
-            </a:schemeClr>
-          </a:lnRef>
-          <a:fillRef idx="1">
-            <a:schemeClr val="accent1"/>
-          </a:fillRef>
-          <a:effectRef idx="0">
-            <a:schemeClr val="accent1"/>
-          </a:effectRef>
-          <a:fontRef idx="minor">
-            <a:schemeClr val="lt1"/>
-          </a:fontRef>
-        </p:style>
-        <p:txBody>
-          <a:bodyPr rtlCol="0" anchor="ctr"/>
-          <a:lstStyle/>
-          <a:p>
-            <a:pPr algn="ctr"/>
-            <a:endParaRPr lang="es-CO" dirty="0"/>
-          </a:p>
-        </p:txBody>
-      </p:sp>
-      <p:sp>
-        <p:nvSpPr>
-          <p:cNvPr id="9" name="CuadroTexto 8">
-            <a:extLst>
-              <a:ext uri="{FF2B5EF4-FFF2-40B4-BE49-F238E27FC236}">
-                <a16:creationId xmlns:a16="http://schemas.microsoft.com/office/drawing/2014/main" id="{977FA8B7-B6C7-43A7-9471-F97A322289DE}"/>
-              </a:ext>
-            </a:extLst>
-          </p:cNvPr>
-          <p:cNvSpPr txBox="1"/>
-          <p:nvPr/>
-        </p:nvSpPr>
-        <p:spPr>
-          <a:xfrm>
-            <a:off x="0" y="235631"/>
-            <a:ext cx="2561160" cy="400110"/>
-          </a:xfrm>
-          <a:prstGeom prst="rect">
-            <a:avLst/>
-          </a:prstGeom>
-          <a:noFill/>
-        </p:spPr>
-        <p:txBody>
-          <a:bodyPr wrap="square" rtlCol="0">
-            <a:spAutoFit/>
-          </a:bodyPr>
-          <a:lstStyle/>
-          <a:p>
-            <a:pPr algn="ctr"/>
-            <a:r>
-              <a:rPr lang="es-CO" sz="2000" dirty="0">
-                <a:latin typeface="Amasis MT Pro Black" panose="020B0604020202020204" pitchFamily="18" charset="0"/>
-              </a:rPr>
-              <a:t>Atom-Huron</a:t>
-            </a:r>
-          </a:p>
-        </p:txBody>
-      </p:sp>
-      <p:sp>
-        <p:nvSpPr>
-          <p:cNvPr id="10" name="CuadroTexto 9">
-            <a:extLst>
-              <a:ext uri="{FF2B5EF4-FFF2-40B4-BE49-F238E27FC236}">
-                <a16:creationId xmlns:a16="http://schemas.microsoft.com/office/drawing/2014/main" id="{F47137B5-0150-4DFE-8356-61925288F916}"/>
-              </a:ext>
-            </a:extLst>
-          </p:cNvPr>
-          <p:cNvSpPr txBox="1"/>
-          <p:nvPr/>
-        </p:nvSpPr>
-        <p:spPr>
-          <a:xfrm>
-            <a:off x="1213338" y="1362808"/>
-            <a:ext cx="3455377" cy="646331"/>
-          </a:xfrm>
-          <a:prstGeom prst="rect">
-            <a:avLst/>
-          </a:prstGeom>
-          <a:noFill/>
-        </p:spPr>
-        <p:txBody>
-          <a:bodyPr wrap="square" rtlCol="0">
-            <a:spAutoFit/>
-          </a:bodyPr>
-          <a:lstStyle/>
-          <a:p>
-            <a:pPr algn="ctr"/>
-            <a:r>
-              <a:rPr lang="es-CO" sz="3600" dirty="0">
-                <a:latin typeface="Aharoni" panose="02010803020104030203" pitchFamily="2" charset="-79"/>
-                <a:cs typeface="Aharoni" panose="02010803020104030203" pitchFamily="2" charset="-79"/>
-              </a:rPr>
-              <a:t>Bienvenido</a:t>
-            </a:r>
-          </a:p>
-        </p:txBody>
-      </p:sp>
-      <p:sp>
-        <p:nvSpPr>
-          <p:cNvPr id="11" name="Pergamino: horizontal 10">
-            <a:extLst>
-              <a:ext uri="{FF2B5EF4-FFF2-40B4-BE49-F238E27FC236}">
-                <a16:creationId xmlns:a16="http://schemas.microsoft.com/office/drawing/2014/main" id="{9F54CD50-283F-4AB7-9265-096A89D16FB3}"/>
-              </a:ext>
-            </a:extLst>
-          </p:cNvPr>
-          <p:cNvSpPr/>
-          <p:nvPr/>
-        </p:nvSpPr>
-        <p:spPr>
-          <a:xfrm>
-            <a:off x="896815" y="2303585"/>
-            <a:ext cx="4088423" cy="1503484"/>
-          </a:xfrm>
-          <a:prstGeom prst="horizontalScroll">
-            <a:avLst/>
-          </a:prstGeom>
-          <a:solidFill>
-            <a:schemeClr val="accent5">
+            <a:schemeClr val="tx2">
               <a:lumMod val="40000"/>
               <a:lumOff val="60000"/>
             </a:schemeClr>
@@ -3593,16 +3396,689 @@
           <a:lstStyle/>
           <a:p>
             <a:pPr algn="ctr"/>
-            <a:endParaRPr lang="es-CO" dirty="0"/>
-          </a:p>
-        </p:txBody>
-      </p:sp>
-      <p:sp>
-        <p:nvSpPr>
-          <p:cNvPr id="12" name="Pergamino: horizontal 11">
-            <a:extLst>
-              <a:ext uri="{FF2B5EF4-FFF2-40B4-BE49-F238E27FC236}">
-                <a16:creationId xmlns:a16="http://schemas.microsoft.com/office/drawing/2014/main" id="{7D6B1354-FBF2-4B6B-BB6C-F922F4652CD8}"/>
+            <a:endParaRPr lang="es-CO"/>
+          </a:p>
+        </p:txBody>
+      </p:sp>
+      <p:grpSp>
+        <p:nvGrpSpPr>
+          <p:cNvPr id="18" name="Grupo 17">
+            <a:extLst>
+              <a:ext uri="{FF2B5EF4-FFF2-40B4-BE49-F238E27FC236}">
+                <a16:creationId xmlns:a16="http://schemas.microsoft.com/office/drawing/2014/main" id="{1AA736B4-3C9F-4252-9988-77EDC7E9D780}"/>
+              </a:ext>
+            </a:extLst>
+          </p:cNvPr>
+          <p:cNvGrpSpPr/>
+          <p:nvPr/>
+        </p:nvGrpSpPr>
+        <p:grpSpPr>
+          <a:xfrm>
+            <a:off x="841117" y="1145628"/>
+            <a:ext cx="4403256" cy="5013434"/>
+            <a:chOff x="841117" y="1145628"/>
+            <a:chExt cx="4403256" cy="5013434"/>
+          </a:xfrm>
+        </p:grpSpPr>
+        <p:sp>
+          <p:nvSpPr>
+            <p:cNvPr id="2" name="Rectángulo 1">
+              <a:extLst>
+                <a:ext uri="{FF2B5EF4-FFF2-40B4-BE49-F238E27FC236}">
+                  <a16:creationId xmlns:a16="http://schemas.microsoft.com/office/drawing/2014/main" id="{E4F3694D-3078-44CB-A9A8-C233E299E6A6}"/>
+                </a:ext>
+              </a:extLst>
+            </p:cNvPr>
+            <p:cNvSpPr/>
+            <p:nvPr/>
+          </p:nvSpPr>
+          <p:spPr>
+            <a:xfrm>
+              <a:off x="903890" y="1145628"/>
+              <a:ext cx="4277710" cy="5013434"/>
+            </a:xfrm>
+            <a:prstGeom prst="rect">
+              <a:avLst/>
+            </a:prstGeom>
+            <a:solidFill>
+              <a:schemeClr val="bg1"/>
+            </a:solidFill>
+            <a:ln w="28575">
+              <a:solidFill>
+                <a:schemeClr val="accent1">
+                  <a:lumMod val="50000"/>
+                </a:schemeClr>
+              </a:solidFill>
+            </a:ln>
+          </p:spPr>
+          <p:style>
+            <a:lnRef idx="2">
+              <a:schemeClr val="accent1">
+                <a:shade val="50000"/>
+              </a:schemeClr>
+            </a:lnRef>
+            <a:fillRef idx="1">
+              <a:schemeClr val="accent1"/>
+            </a:fillRef>
+            <a:effectRef idx="0">
+              <a:schemeClr val="accent1"/>
+            </a:effectRef>
+            <a:fontRef idx="minor">
+              <a:schemeClr val="lt1"/>
+            </a:fontRef>
+          </p:style>
+          <p:txBody>
+            <a:bodyPr rtlCol="0" anchor="ctr"/>
+            <a:lstStyle/>
+            <a:p>
+              <a:pPr algn="ctr"/>
+              <a:endParaRPr lang="es-CO"/>
+            </a:p>
+          </p:txBody>
+        </p:sp>
+        <p:pic>
+          <p:nvPicPr>
+            <p:cNvPr id="5" name="Imagen 4" descr="Una caricatura de una persona&#10;&#10;Descripción generada automáticamente con confianza baja">
+              <a:extLst>
+                <a:ext uri="{FF2B5EF4-FFF2-40B4-BE49-F238E27FC236}">
+                  <a16:creationId xmlns:a16="http://schemas.microsoft.com/office/drawing/2014/main" id="{CBF63FD3-8B8D-48F4-A6D2-BA4DBD9F1457}"/>
+                </a:ext>
+              </a:extLst>
+            </p:cNvPr>
+            <p:cNvPicPr>
+              <a:picLocks noChangeAspect="1"/>
+            </p:cNvPicPr>
+            <p:nvPr/>
+          </p:nvPicPr>
+          <p:blipFill>
+            <a:blip r:embed="rId2">
+              <a:extLst>
+                <a:ext uri="{28A0092B-C50C-407E-A947-70E740481C1C}">
+                  <a14:useLocalDpi xmlns:a14="http://schemas.microsoft.com/office/drawing/2010/main" val="0"/>
+                </a:ext>
+              </a:extLst>
+            </a:blip>
+            <a:stretch>
+              <a:fillRect/>
+            </a:stretch>
+          </p:blipFill>
+          <p:spPr>
+            <a:xfrm>
+              <a:off x="2928343" y="1195171"/>
+              <a:ext cx="1730872" cy="1304710"/>
+            </a:xfrm>
+            <a:prstGeom prst="rect">
+              <a:avLst/>
+            </a:prstGeom>
+          </p:spPr>
+        </p:pic>
+        <p:sp>
+          <p:nvSpPr>
+            <p:cNvPr id="10" name="CuadroTexto 9">
+              <a:extLst>
+                <a:ext uri="{FF2B5EF4-FFF2-40B4-BE49-F238E27FC236}">
+                  <a16:creationId xmlns:a16="http://schemas.microsoft.com/office/drawing/2014/main" id="{F47137B5-0150-4DFE-8356-61925288F916}"/>
+                </a:ext>
+              </a:extLst>
+            </p:cNvPr>
+            <p:cNvSpPr txBox="1"/>
+            <p:nvPr/>
+          </p:nvSpPr>
+          <p:spPr>
+            <a:xfrm>
+              <a:off x="1274885" y="1356255"/>
+              <a:ext cx="2079128" cy="830997"/>
+            </a:xfrm>
+            <a:prstGeom prst="rect">
+              <a:avLst/>
+            </a:prstGeom>
+            <a:noFill/>
+          </p:spPr>
+          <p:txBody>
+            <a:bodyPr wrap="square" rtlCol="0">
+              <a:spAutoFit/>
+            </a:bodyPr>
+            <a:lstStyle/>
+            <a:p>
+              <a:r>
+                <a:rPr lang="es-CO" sz="2400" dirty="0">
+                  <a:effectLst>
+                    <a:outerShdw blurRad="38100" dist="38100" dir="2700000" algn="tl">
+                      <a:srgbClr val="000000">
+                        <a:alpha val="43137"/>
+                      </a:srgbClr>
+                    </a:outerShdw>
+                  </a:effectLst>
+                  <a:cs typeface="Aharoni" panose="02010803020104030203" pitchFamily="2" charset="-79"/>
+                </a:rPr>
+                <a:t>Bienvenido a </a:t>
+              </a:r>
+            </a:p>
+            <a:p>
+              <a:r>
+                <a:rPr lang="es-CO" sz="2400" dirty="0" err="1">
+                  <a:effectLst>
+                    <a:outerShdw blurRad="38100" dist="38100" dir="2700000" algn="tl">
+                      <a:srgbClr val="000000">
+                        <a:alpha val="43137"/>
+                      </a:srgbClr>
+                    </a:outerShdw>
+                  </a:effectLst>
+                  <a:cs typeface="Aharoni" panose="02010803020104030203" pitchFamily="2" charset="-79"/>
+                </a:rPr>
+                <a:t>Atom</a:t>
+              </a:r>
+              <a:r>
+                <a:rPr lang="es-CO" sz="2400" dirty="0">
+                  <a:effectLst>
+                    <a:outerShdw blurRad="38100" dist="38100" dir="2700000" algn="tl">
+                      <a:srgbClr val="000000">
+                        <a:alpha val="43137"/>
+                      </a:srgbClr>
+                    </a:outerShdw>
+                  </a:effectLst>
+                  <a:cs typeface="Aharoni" panose="02010803020104030203" pitchFamily="2" charset="-79"/>
+                </a:rPr>
+                <a:t>-Huron</a:t>
+              </a:r>
+            </a:p>
+          </p:txBody>
+        </p:sp>
+        <p:sp>
+          <p:nvSpPr>
+            <p:cNvPr id="14" name="Rectángulo: esquinas diagonales cortadas 13">
+              <a:extLst>
+                <a:ext uri="{FF2B5EF4-FFF2-40B4-BE49-F238E27FC236}">
+                  <a16:creationId xmlns:a16="http://schemas.microsoft.com/office/drawing/2014/main" id="{9E509717-2FE1-4FBE-B41F-F1E0973D63E6}"/>
+                </a:ext>
+              </a:extLst>
+            </p:cNvPr>
+            <p:cNvSpPr/>
+            <p:nvPr/>
+          </p:nvSpPr>
+          <p:spPr>
+            <a:xfrm>
+              <a:off x="1371600" y="2998177"/>
+              <a:ext cx="3297115" cy="430823"/>
+            </a:xfrm>
+            <a:prstGeom prst="snip2DiagRect">
+              <a:avLst/>
+            </a:prstGeom>
+            <a:solidFill>
+              <a:schemeClr val="accent5">
+                <a:lumMod val="20000"/>
+                <a:lumOff val="80000"/>
+              </a:schemeClr>
+            </a:solidFill>
+          </p:spPr>
+          <p:style>
+            <a:lnRef idx="2">
+              <a:schemeClr val="accent1">
+                <a:shade val="50000"/>
+              </a:schemeClr>
+            </a:lnRef>
+            <a:fillRef idx="1">
+              <a:schemeClr val="accent1"/>
+            </a:fillRef>
+            <a:effectRef idx="0">
+              <a:schemeClr val="accent1"/>
+            </a:effectRef>
+            <a:fontRef idx="minor">
+              <a:schemeClr val="lt1"/>
+            </a:fontRef>
+          </p:style>
+          <p:txBody>
+            <a:bodyPr rtlCol="0" anchor="ctr"/>
+            <a:lstStyle/>
+            <a:p>
+              <a:pPr algn="ctr"/>
+              <a:endParaRPr lang="es-CO" dirty="0"/>
+            </a:p>
+          </p:txBody>
+        </p:sp>
+        <p:sp>
+          <p:nvSpPr>
+            <p:cNvPr id="15" name="Rectángulo: esquinas diagonales cortadas 14">
+              <a:extLst>
+                <a:ext uri="{FF2B5EF4-FFF2-40B4-BE49-F238E27FC236}">
+                  <a16:creationId xmlns:a16="http://schemas.microsoft.com/office/drawing/2014/main" id="{A2B209E7-00EA-4C5B-A9AA-60ACB2C0EB2C}"/>
+                </a:ext>
+              </a:extLst>
+            </p:cNvPr>
+            <p:cNvSpPr/>
+            <p:nvPr/>
+          </p:nvSpPr>
+          <p:spPr>
+            <a:xfrm>
+              <a:off x="1371600" y="4101698"/>
+              <a:ext cx="3297115" cy="430823"/>
+            </a:xfrm>
+            <a:prstGeom prst="snip2DiagRect">
+              <a:avLst/>
+            </a:prstGeom>
+            <a:solidFill>
+              <a:schemeClr val="accent5">
+                <a:lumMod val="20000"/>
+                <a:lumOff val="80000"/>
+              </a:schemeClr>
+            </a:solidFill>
+          </p:spPr>
+          <p:style>
+            <a:lnRef idx="2">
+              <a:schemeClr val="accent1">
+                <a:shade val="50000"/>
+              </a:schemeClr>
+            </a:lnRef>
+            <a:fillRef idx="1">
+              <a:schemeClr val="accent1"/>
+            </a:fillRef>
+            <a:effectRef idx="0">
+              <a:schemeClr val="accent1"/>
+            </a:effectRef>
+            <a:fontRef idx="minor">
+              <a:schemeClr val="lt1"/>
+            </a:fontRef>
+          </p:style>
+          <p:txBody>
+            <a:bodyPr rtlCol="0" anchor="ctr"/>
+            <a:lstStyle/>
+            <a:p>
+              <a:pPr algn="ctr"/>
+              <a:endParaRPr lang="es-CO" dirty="0"/>
+            </a:p>
+          </p:txBody>
+        </p:sp>
+        <p:sp>
+          <p:nvSpPr>
+            <p:cNvPr id="16" name="CuadroTexto 15">
+              <a:extLst>
+                <a:ext uri="{FF2B5EF4-FFF2-40B4-BE49-F238E27FC236}">
+                  <a16:creationId xmlns:a16="http://schemas.microsoft.com/office/drawing/2014/main" id="{2B417448-937B-4566-98C8-BDC768B91C66}"/>
+                </a:ext>
+              </a:extLst>
+            </p:cNvPr>
+            <p:cNvSpPr txBox="1"/>
+            <p:nvPr/>
+          </p:nvSpPr>
+          <p:spPr>
+            <a:xfrm>
+              <a:off x="1274885" y="2523353"/>
+              <a:ext cx="3200400" cy="400110"/>
+            </a:xfrm>
+            <a:prstGeom prst="rect">
+              <a:avLst/>
+            </a:prstGeom>
+            <a:noFill/>
+          </p:spPr>
+          <p:txBody>
+            <a:bodyPr wrap="square" rtlCol="0">
+              <a:spAutoFit/>
+            </a:bodyPr>
+            <a:lstStyle/>
+            <a:p>
+              <a:r>
+                <a:rPr lang="es-CO" sz="2000" dirty="0">
+                  <a:latin typeface="Abadi" panose="020B0604020104020204" pitchFamily="34" charset="0"/>
+                </a:rPr>
+                <a:t>Usuario:</a:t>
+              </a:r>
+            </a:p>
+          </p:txBody>
+        </p:sp>
+        <p:sp>
+          <p:nvSpPr>
+            <p:cNvPr id="17" name="CuadroTexto 16">
+              <a:extLst>
+                <a:ext uri="{FF2B5EF4-FFF2-40B4-BE49-F238E27FC236}">
+                  <a16:creationId xmlns:a16="http://schemas.microsoft.com/office/drawing/2014/main" id="{9EA4B946-F878-40D0-B25E-D2CC079CA511}"/>
+                </a:ext>
+              </a:extLst>
+            </p:cNvPr>
+            <p:cNvSpPr txBox="1"/>
+            <p:nvPr/>
+          </p:nvSpPr>
+          <p:spPr>
+            <a:xfrm>
+              <a:off x="841117" y="3683902"/>
+              <a:ext cx="2338753" cy="400110"/>
+            </a:xfrm>
+            <a:prstGeom prst="rect">
+              <a:avLst/>
+            </a:prstGeom>
+            <a:noFill/>
+          </p:spPr>
+          <p:txBody>
+            <a:bodyPr wrap="square" rtlCol="0">
+              <a:spAutoFit/>
+            </a:bodyPr>
+            <a:lstStyle/>
+            <a:p>
+              <a:pPr algn="ctr"/>
+              <a:r>
+                <a:rPr lang="es-CO" sz="2000" dirty="0">
+                  <a:latin typeface="Abadi" panose="020B0604020104020204" pitchFamily="34" charset="0"/>
+                </a:rPr>
+                <a:t>Contraseña:</a:t>
+              </a:r>
+            </a:p>
+          </p:txBody>
+        </p:sp>
+        <p:sp>
+          <p:nvSpPr>
+            <p:cNvPr id="19" name="CuadroTexto 18">
+              <a:extLst>
+                <a:ext uri="{FF2B5EF4-FFF2-40B4-BE49-F238E27FC236}">
+                  <a16:creationId xmlns:a16="http://schemas.microsoft.com/office/drawing/2014/main" id="{B2BE2AA8-EB48-4850-A65B-B96A3DBF265E}"/>
+                </a:ext>
+              </a:extLst>
+            </p:cNvPr>
+            <p:cNvSpPr txBox="1"/>
+            <p:nvPr/>
+          </p:nvSpPr>
+          <p:spPr>
+            <a:xfrm>
+              <a:off x="1426755" y="3075051"/>
+              <a:ext cx="1568794" cy="369332"/>
+            </a:xfrm>
+            <a:prstGeom prst="rect">
+              <a:avLst/>
+            </a:prstGeom>
+            <a:noFill/>
+          </p:spPr>
+          <p:txBody>
+            <a:bodyPr wrap="square" rtlCol="0">
+              <a:spAutoFit/>
+            </a:bodyPr>
+            <a:lstStyle/>
+            <a:p>
+              <a:r>
+                <a:rPr lang="en-CA" dirty="0"/>
+                <a:t>UsrAdmin</a:t>
+              </a:r>
+              <a:endParaRPr lang="es-CO" dirty="0"/>
+            </a:p>
+          </p:txBody>
+        </p:sp>
+        <p:sp>
+          <p:nvSpPr>
+            <p:cNvPr id="20" name="CuadroTexto 19">
+              <a:extLst>
+                <a:ext uri="{FF2B5EF4-FFF2-40B4-BE49-F238E27FC236}">
+                  <a16:creationId xmlns:a16="http://schemas.microsoft.com/office/drawing/2014/main" id="{79EAB2BE-9BE1-4791-A3F1-B4D5F0FFE52E}"/>
+                </a:ext>
+              </a:extLst>
+            </p:cNvPr>
+            <p:cNvSpPr txBox="1"/>
+            <p:nvPr/>
+          </p:nvSpPr>
+          <p:spPr>
+            <a:xfrm>
+              <a:off x="1419262" y="4202279"/>
+              <a:ext cx="2248824" cy="369332"/>
+            </a:xfrm>
+            <a:prstGeom prst="rect">
+              <a:avLst/>
+            </a:prstGeom>
+            <a:noFill/>
+          </p:spPr>
+          <p:txBody>
+            <a:bodyPr wrap="square" rtlCol="0">
+              <a:spAutoFit/>
+            </a:bodyPr>
+            <a:lstStyle/>
+            <a:p>
+              <a:r>
+                <a:rPr lang="en-CA" dirty="0"/>
+                <a:t>* * * * * * * * * * </a:t>
+              </a:r>
+              <a:endParaRPr lang="es-CO" dirty="0"/>
+            </a:p>
+          </p:txBody>
+        </p:sp>
+        <p:sp>
+          <p:nvSpPr>
+            <p:cNvPr id="22" name="Rectángulo 21">
+              <a:extLst>
+                <a:ext uri="{FF2B5EF4-FFF2-40B4-BE49-F238E27FC236}">
+                  <a16:creationId xmlns:a16="http://schemas.microsoft.com/office/drawing/2014/main" id="{66150BD1-FC05-4600-AB89-960723C729EE}"/>
+                </a:ext>
+              </a:extLst>
+            </p:cNvPr>
+            <p:cNvSpPr/>
+            <p:nvPr/>
+          </p:nvSpPr>
+          <p:spPr>
+            <a:xfrm>
+              <a:off x="1606845" y="3488313"/>
+              <a:ext cx="1321498" cy="234188"/>
+            </a:xfrm>
+            <a:prstGeom prst="rect">
+              <a:avLst/>
+            </a:prstGeom>
+            <a:solidFill>
+              <a:schemeClr val="bg1"/>
+            </a:solidFill>
+            <a:ln>
+              <a:solidFill>
+                <a:schemeClr val="bg1"/>
+              </a:solidFill>
+            </a:ln>
+          </p:spPr>
+          <p:style>
+            <a:lnRef idx="2">
+              <a:schemeClr val="accent1">
+                <a:shade val="50000"/>
+              </a:schemeClr>
+            </a:lnRef>
+            <a:fillRef idx="1">
+              <a:schemeClr val="accent1"/>
+            </a:fillRef>
+            <a:effectRef idx="0">
+              <a:schemeClr val="accent1"/>
+            </a:effectRef>
+            <a:fontRef idx="minor">
+              <a:schemeClr val="lt1"/>
+            </a:fontRef>
+          </p:style>
+          <p:txBody>
+            <a:bodyPr rtlCol="0" anchor="ctr"/>
+            <a:lstStyle/>
+            <a:p>
+              <a:r>
+                <a:rPr lang="es-CO" sz="1200" i="1" dirty="0">
+                  <a:solidFill>
+                    <a:schemeClr val="tx1"/>
+                  </a:solidFill>
+                  <a:latin typeface="Candara" panose="020E0502030303020204" pitchFamily="34" charset="0"/>
+                </a:rPr>
+                <a:t>Recordar Usuario</a:t>
+              </a:r>
+            </a:p>
+          </p:txBody>
+        </p:sp>
+        <p:sp>
+          <p:nvSpPr>
+            <p:cNvPr id="23" name="CuadroTexto 22">
+              <a:extLst>
+                <a:ext uri="{FF2B5EF4-FFF2-40B4-BE49-F238E27FC236}">
+                  <a16:creationId xmlns:a16="http://schemas.microsoft.com/office/drawing/2014/main" id="{BFE6A604-762A-4600-B5AE-6CD1B79BA3F0}"/>
+                </a:ext>
+              </a:extLst>
+            </p:cNvPr>
+            <p:cNvSpPr txBox="1"/>
+            <p:nvPr/>
+          </p:nvSpPr>
+          <p:spPr>
+            <a:xfrm>
+              <a:off x="2995549" y="4522396"/>
+              <a:ext cx="2248824" cy="307777"/>
+            </a:xfrm>
+            <a:prstGeom prst="rect">
+              <a:avLst/>
+            </a:prstGeom>
+            <a:noFill/>
+          </p:spPr>
+          <p:txBody>
+            <a:bodyPr wrap="square" rtlCol="0">
+              <a:spAutoFit/>
+            </a:bodyPr>
+            <a:lstStyle/>
+            <a:p>
+              <a:r>
+                <a:rPr lang="es-MX" sz="1400" i="1" dirty="0">
+                  <a:effectLst>
+                    <a:outerShdw blurRad="38100" dist="38100" dir="2700000" algn="tl">
+                      <a:srgbClr val="000000">
+                        <a:alpha val="43137"/>
+                      </a:srgbClr>
+                    </a:outerShdw>
+                  </a:effectLst>
+                  <a:latin typeface="Candara" panose="020E0502030303020204" pitchFamily="34" charset="0"/>
+                </a:rPr>
+                <a:t>Olvidé </a:t>
+              </a:r>
+              <a:r>
+                <a:rPr lang="en-US" sz="1400" i="1" dirty="0">
+                  <a:effectLst>
+                    <a:outerShdw blurRad="38100" dist="38100" dir="2700000" algn="tl">
+                      <a:srgbClr val="000000">
+                        <a:alpha val="43137"/>
+                      </a:srgbClr>
+                    </a:outerShdw>
+                  </a:effectLst>
+                  <a:latin typeface="Candara" panose="020E0502030303020204" pitchFamily="34" charset="0"/>
+                </a:rPr>
+                <a:t>La </a:t>
+              </a:r>
+              <a:r>
+                <a:rPr lang="es-CO" sz="1400" i="1" dirty="0">
+                  <a:effectLst>
+                    <a:outerShdw blurRad="38100" dist="38100" dir="2700000" algn="tl">
+                      <a:srgbClr val="000000">
+                        <a:alpha val="43137"/>
+                      </a:srgbClr>
+                    </a:outerShdw>
+                  </a:effectLst>
+                  <a:latin typeface="Candara" panose="020E0502030303020204" pitchFamily="34" charset="0"/>
+                </a:rPr>
+                <a:t>Contraseña</a:t>
+              </a:r>
+            </a:p>
+          </p:txBody>
+        </p:sp>
+        <p:sp>
+          <p:nvSpPr>
+            <p:cNvPr id="21" name="Rectángulo 20">
+              <a:extLst>
+                <a:ext uri="{FF2B5EF4-FFF2-40B4-BE49-F238E27FC236}">
+                  <a16:creationId xmlns:a16="http://schemas.microsoft.com/office/drawing/2014/main" id="{7F7EFB37-ECB9-4A87-93C1-DFA1CBAFE7CC}"/>
+                </a:ext>
+              </a:extLst>
+            </p:cNvPr>
+            <p:cNvSpPr/>
+            <p:nvPr/>
+          </p:nvSpPr>
+          <p:spPr>
+            <a:xfrm>
+              <a:off x="1552890" y="3508297"/>
+              <a:ext cx="107909" cy="153827"/>
+            </a:xfrm>
+            <a:prstGeom prst="rect">
+              <a:avLst/>
+            </a:prstGeom>
+            <a:solidFill>
+              <a:schemeClr val="accent2">
+                <a:lumMod val="20000"/>
+                <a:lumOff val="80000"/>
+              </a:schemeClr>
+            </a:solidFill>
+          </p:spPr>
+          <p:style>
+            <a:lnRef idx="2">
+              <a:schemeClr val="accent1">
+                <a:shade val="50000"/>
+              </a:schemeClr>
+            </a:lnRef>
+            <a:fillRef idx="1">
+              <a:schemeClr val="accent1"/>
+            </a:fillRef>
+            <a:effectRef idx="0">
+              <a:schemeClr val="accent1"/>
+            </a:effectRef>
+            <a:fontRef idx="minor">
+              <a:schemeClr val="lt1"/>
+            </a:fontRef>
+          </p:style>
+          <p:txBody>
+            <a:bodyPr rtlCol="0" anchor="ctr"/>
+            <a:lstStyle/>
+            <a:p>
+              <a:pPr algn="ctr"/>
+              <a:endParaRPr lang="es-CO" dirty="0"/>
+            </a:p>
+          </p:txBody>
+        </p:sp>
+        <p:sp>
+          <p:nvSpPr>
+            <p:cNvPr id="3" name="Rectángulo: esquinas redondeadas 2">
+              <a:extLst>
+                <a:ext uri="{FF2B5EF4-FFF2-40B4-BE49-F238E27FC236}">
+                  <a16:creationId xmlns:a16="http://schemas.microsoft.com/office/drawing/2014/main" id="{395921EA-A2CD-4539-A22C-885ECD2A1351}"/>
+                </a:ext>
+              </a:extLst>
+            </p:cNvPr>
+            <p:cNvSpPr/>
+            <p:nvPr/>
+          </p:nvSpPr>
+          <p:spPr>
+            <a:xfrm>
+              <a:off x="3633244" y="4937596"/>
+              <a:ext cx="1025971" cy="364220"/>
+            </a:xfrm>
+            <a:prstGeom prst="roundRect">
+              <a:avLst/>
+            </a:prstGeom>
+            <a:solidFill>
+              <a:schemeClr val="accent1">
+                <a:lumMod val="50000"/>
+              </a:schemeClr>
+            </a:solidFill>
+          </p:spPr>
+          <p:style>
+            <a:lnRef idx="2">
+              <a:schemeClr val="accent1">
+                <a:shade val="50000"/>
+              </a:schemeClr>
+            </a:lnRef>
+            <a:fillRef idx="1">
+              <a:schemeClr val="accent1"/>
+            </a:fillRef>
+            <a:effectRef idx="0">
+              <a:schemeClr val="accent1"/>
+            </a:effectRef>
+            <a:fontRef idx="minor">
+              <a:schemeClr val="lt1"/>
+            </a:fontRef>
+          </p:style>
+          <p:txBody>
+            <a:bodyPr rtlCol="0" anchor="ctr"/>
+            <a:lstStyle/>
+            <a:p>
+              <a:pPr algn="ctr"/>
+              <a:r>
+                <a:rPr lang="es-CO" sz="1600" dirty="0"/>
+                <a:t>Acceder</a:t>
+              </a:r>
+            </a:p>
+          </p:txBody>
+        </p:sp>
+      </p:grpSp>
+      <p:sp>
+        <p:nvSpPr>
+          <p:cNvPr id="4" name="Flecha: a la derecha 3">
+            <a:extLst>
+              <a:ext uri="{FF2B5EF4-FFF2-40B4-BE49-F238E27FC236}">
+                <a16:creationId xmlns:a16="http://schemas.microsoft.com/office/drawing/2014/main" id="{142D87E9-9B58-43A8-A43A-A74638B215D6}"/>
               </a:ext>
             </a:extLst>
           </p:cNvPr>
@@ -3611,18 +4087,24 @@
         </p:nvSpPr>
         <p:spPr>
           <a:xfrm>
-            <a:off x="896814" y="4233497"/>
-            <a:ext cx="4088423" cy="1503484"/>
+            <a:off x="4758388" y="4472393"/>
+            <a:ext cx="1334168" cy="400109"/>
           </a:xfrm>
-          <a:prstGeom prst="horizontalScroll">
+          <a:prstGeom prst="rightArrow">
             <a:avLst/>
           </a:prstGeom>
           <a:solidFill>
-            <a:schemeClr val="accent5">
-              <a:lumMod val="40000"/>
-              <a:lumOff val="60000"/>
+            <a:schemeClr val="accent1">
+              <a:lumMod val="50000"/>
             </a:schemeClr>
           </a:solidFill>
+          <a:ln>
+            <a:solidFill>
+              <a:schemeClr val="tx2">
+                <a:lumMod val="50000"/>
+              </a:schemeClr>
+            </a:solidFill>
+          </a:ln>
         </p:spPr>
         <p:style>
           <a:lnRef idx="2">
@@ -3645,16 +4127,96 @@
           <a:lstStyle/>
           <a:p>
             <a:pPr algn="ctr"/>
-            <a:endParaRPr lang="es-CO" dirty="0"/>
-          </a:p>
-        </p:txBody>
-      </p:sp>
-      <p:sp>
-        <p:nvSpPr>
-          <p:cNvPr id="14" name="Rectángulo: esquinas diagonales cortadas 13">
-            <a:extLst>
-              <a:ext uri="{FF2B5EF4-FFF2-40B4-BE49-F238E27FC236}">
-                <a16:creationId xmlns:a16="http://schemas.microsoft.com/office/drawing/2014/main" id="{9E509717-2FE1-4FBE-B41F-F1E0973D63E6}"/>
+            <a:endParaRPr lang="es-CO"/>
+          </a:p>
+        </p:txBody>
+      </p:sp>
+      <p:pic>
+        <p:nvPicPr>
+          <p:cNvPr id="24" name="Imagen 23" descr="Una caricatura de una persona&#10;&#10;Descripción generada automáticamente con confianza baja">
+            <a:extLst>
+              <a:ext uri="{FF2B5EF4-FFF2-40B4-BE49-F238E27FC236}">
+                <a16:creationId xmlns:a16="http://schemas.microsoft.com/office/drawing/2014/main" id="{54A6B196-6A65-4701-8465-99D5EA5D1BC4}"/>
+              </a:ext>
+            </a:extLst>
+          </p:cNvPr>
+          <p:cNvPicPr>
+            <a:picLocks noChangeAspect="1"/>
+          </p:cNvPicPr>
+          <p:nvPr/>
+        </p:nvPicPr>
+        <p:blipFill>
+          <a:blip r:embed="rId2">
+            <a:extLst>
+              <a:ext uri="{28A0092B-C50C-407E-A947-70E740481C1C}">
+                <a14:useLocalDpi xmlns:a14="http://schemas.microsoft.com/office/drawing/2010/main" val="0"/>
+              </a:ext>
+            </a:extLst>
+          </a:blip>
+          <a:stretch>
+            <a:fillRect/>
+          </a:stretch>
+        </p:blipFill>
+        <p:spPr>
+          <a:xfrm>
+            <a:off x="7716992" y="1142230"/>
+            <a:ext cx="1730872" cy="1304710"/>
+          </a:xfrm>
+          <a:prstGeom prst="rect">
+            <a:avLst/>
+          </a:prstGeom>
+        </p:spPr>
+      </p:pic>
+      <p:sp>
+        <p:nvSpPr>
+          <p:cNvPr id="25" name="CuadroTexto 24">
+            <a:extLst>
+              <a:ext uri="{FF2B5EF4-FFF2-40B4-BE49-F238E27FC236}">
+                <a16:creationId xmlns:a16="http://schemas.microsoft.com/office/drawing/2014/main" id="{1DB8A22D-8015-45D2-87C7-2AB88DC1198A}"/>
+              </a:ext>
+            </a:extLst>
+          </p:cNvPr>
+          <p:cNvSpPr txBox="1"/>
+          <p:nvPr/>
+        </p:nvSpPr>
+        <p:spPr>
+          <a:xfrm>
+            <a:off x="6063534" y="1354556"/>
+            <a:ext cx="2079128" cy="830997"/>
+          </a:xfrm>
+          <a:prstGeom prst="rect">
+            <a:avLst/>
+          </a:prstGeom>
+          <a:noFill/>
+        </p:spPr>
+        <p:txBody>
+          <a:bodyPr wrap="square" rtlCol="0">
+            <a:spAutoFit/>
+          </a:bodyPr>
+          <a:lstStyle/>
+          <a:p>
+            <a:r>
+              <a:rPr lang="es-CO" sz="2400" dirty="0">
+                <a:effectLst>
+                  <a:outerShdw blurRad="38100" dist="38100" dir="2700000" algn="tl">
+                    <a:srgbClr val="000000">
+                      <a:alpha val="43137"/>
+                    </a:srgbClr>
+                  </a:outerShdw>
+                </a:effectLst>
+                <a:cs typeface="Aharoni" panose="02010803020104030203" pitchFamily="2" charset="-79"/>
+              </a:rPr>
+              <a:t>Olvidaste tu contraseña</a:t>
+            </a:r>
+          </a:p>
+        </p:txBody>
+      </p:sp>
+      <p:sp>
+        <p:nvSpPr>
+          <p:cNvPr id="26" name="Rectángulo: esquinas diagonales cortadas 25">
+            <a:extLst>
+              <a:ext uri="{FF2B5EF4-FFF2-40B4-BE49-F238E27FC236}">
+                <a16:creationId xmlns:a16="http://schemas.microsoft.com/office/drawing/2014/main" id="{0170B227-C3E3-4809-BD2B-6BD52E54EF61}"/>
               </a:ext>
             </a:extLst>
           </p:cNvPr>
@@ -3663,7 +4225,7 @@
         </p:nvSpPr>
         <p:spPr>
           <a:xfrm>
-            <a:off x="1371600" y="2998177"/>
+            <a:off x="6160249" y="2996478"/>
             <a:ext cx="3297115" cy="430823"/>
           </a:xfrm>
           <a:prstGeom prst="snip2DiagRect">
@@ -3703,10 +4265,10 @@
       </p:sp>
       <p:sp>
         <p:nvSpPr>
-          <p:cNvPr id="15" name="Rectángulo: esquinas diagonales cortadas 14">
-            <a:extLst>
-              <a:ext uri="{FF2B5EF4-FFF2-40B4-BE49-F238E27FC236}">
-                <a16:creationId xmlns:a16="http://schemas.microsoft.com/office/drawing/2014/main" id="{A2B209E7-00EA-4C5B-A9AA-60ACB2C0EB2C}"/>
+          <p:cNvPr id="27" name="Rectángulo: esquinas diagonales cortadas 26">
+            <a:extLst>
+              <a:ext uri="{FF2B5EF4-FFF2-40B4-BE49-F238E27FC236}">
+                <a16:creationId xmlns:a16="http://schemas.microsoft.com/office/drawing/2014/main" id="{C3C671B4-3615-4C44-8B0C-867C5A8973A4}"/>
               </a:ext>
             </a:extLst>
           </p:cNvPr>
@@ -3715,7 +4277,7 @@
         </p:nvSpPr>
         <p:spPr>
           <a:xfrm>
-            <a:off x="1371600" y="4906059"/>
+            <a:off x="6160249" y="3814667"/>
             <a:ext cx="3297115" cy="430823"/>
           </a:xfrm>
           <a:prstGeom prst="snip2DiagRect">
@@ -3755,10 +4317,10 @@
       </p:sp>
       <p:sp>
         <p:nvSpPr>
-          <p:cNvPr id="16" name="CuadroTexto 15">
-            <a:extLst>
-              <a:ext uri="{FF2B5EF4-FFF2-40B4-BE49-F238E27FC236}">
-                <a16:creationId xmlns:a16="http://schemas.microsoft.com/office/drawing/2014/main" id="{2B417448-937B-4566-98C8-BDC768B91C66}"/>
+          <p:cNvPr id="28" name="CuadroTexto 27">
+            <a:extLst>
+              <a:ext uri="{FF2B5EF4-FFF2-40B4-BE49-F238E27FC236}">
+                <a16:creationId xmlns:a16="http://schemas.microsoft.com/office/drawing/2014/main" id="{583CBAF0-01BE-4714-AD47-E8EC2B33A580}"/>
               </a:ext>
             </a:extLst>
           </p:cNvPr>
@@ -3767,8 +4329,8 @@
         </p:nvSpPr>
         <p:spPr>
           <a:xfrm>
-            <a:off x="1274885" y="2523353"/>
-            <a:ext cx="3200400" cy="523220"/>
+            <a:off x="6063534" y="2521654"/>
+            <a:ext cx="3200400" cy="400110"/>
           </a:xfrm>
           <a:prstGeom prst="rect">
             <a:avLst/>
@@ -3782,20 +4344,20 @@
           <a:lstStyle/>
           <a:p>
             <a:r>
-              <a:rPr lang="es-CO" sz="2800" dirty="0">
+              <a:rPr lang="es-CO" sz="2000" dirty="0">
                 <a:latin typeface="Abadi" panose="020B0604020104020204" pitchFamily="34" charset="0"/>
               </a:rPr>
-              <a:t>Usuario</a:t>
-            </a:r>
-          </a:p>
-        </p:txBody>
-      </p:sp>
-      <p:sp>
-        <p:nvSpPr>
-          <p:cNvPr id="17" name="CuadroTexto 16">
-            <a:extLst>
-              <a:ext uri="{FF2B5EF4-FFF2-40B4-BE49-F238E27FC236}">
-                <a16:creationId xmlns:a16="http://schemas.microsoft.com/office/drawing/2014/main" id="{9EA4B946-F878-40D0-B25E-D2CC079CA511}"/>
+              <a:t>Usuario:</a:t>
+            </a:r>
+          </a:p>
+        </p:txBody>
+      </p:sp>
+      <p:sp>
+        <p:nvSpPr>
+          <p:cNvPr id="29" name="CuadroTexto 28">
+            <a:extLst>
+              <a:ext uri="{FF2B5EF4-FFF2-40B4-BE49-F238E27FC236}">
+                <a16:creationId xmlns:a16="http://schemas.microsoft.com/office/drawing/2014/main" id="{022AEB1A-45A8-4B17-8BA5-BF18DE425AEE}"/>
               </a:ext>
             </a:extLst>
           </p:cNvPr>
@@ -3804,8 +4366,8 @@
         </p:nvSpPr>
         <p:spPr>
           <a:xfrm>
-            <a:off x="1055078" y="4462019"/>
-            <a:ext cx="2338753" cy="523220"/>
+            <a:off x="6063534" y="3439766"/>
+            <a:ext cx="2338753" cy="400110"/>
           </a:xfrm>
           <a:prstGeom prst="rect">
             <a:avLst/>
@@ -3820,20 +4382,20 @@
           <a:p>
             <a:pPr algn="ctr"/>
             <a:r>
-              <a:rPr lang="es-CO" sz="2800" dirty="0">
+              <a:rPr lang="es-CO" sz="2000" dirty="0">
                 <a:latin typeface="Abadi" panose="020B0604020104020204" pitchFamily="34" charset="0"/>
               </a:rPr>
-              <a:t>Contraseña</a:t>
-            </a:r>
-          </a:p>
-        </p:txBody>
-      </p:sp>
-      <p:sp>
-        <p:nvSpPr>
-          <p:cNvPr id="19" name="CuadroTexto 18">
-            <a:extLst>
-              <a:ext uri="{FF2B5EF4-FFF2-40B4-BE49-F238E27FC236}">
-                <a16:creationId xmlns:a16="http://schemas.microsoft.com/office/drawing/2014/main" id="{B2BE2AA8-EB48-4850-A65B-B96A3DBF265E}"/>
+              <a:t>Correo electrónico:</a:t>
+            </a:r>
+          </a:p>
+        </p:txBody>
+      </p:sp>
+      <p:sp>
+        <p:nvSpPr>
+          <p:cNvPr id="30" name="CuadroTexto 29">
+            <a:extLst>
+              <a:ext uri="{FF2B5EF4-FFF2-40B4-BE49-F238E27FC236}">
+                <a16:creationId xmlns:a16="http://schemas.microsoft.com/office/drawing/2014/main" id="{82DB378D-1DA7-4892-B79A-E7FE202D5B6E}"/>
               </a:ext>
             </a:extLst>
           </p:cNvPr>
@@ -3842,8 +4404,8 @@
         </p:nvSpPr>
         <p:spPr>
           <a:xfrm>
-            <a:off x="1426755" y="3075051"/>
-            <a:ext cx="4384962" cy="369332"/>
+            <a:off x="6215404" y="3073352"/>
+            <a:ext cx="1568794" cy="338554"/>
           </a:xfrm>
           <a:prstGeom prst="rect">
             <a:avLst/>
@@ -3857,19 +4419,19 @@
           <a:lstStyle/>
           <a:p>
             <a:r>
-              <a:rPr lang="en-CA" dirty="0"/>
-              <a:t>* * * * * * * * * * </a:t>
-            </a:r>
-            <a:endParaRPr lang="es-CO" dirty="0"/>
-          </a:p>
-        </p:txBody>
-      </p:sp>
-      <p:sp>
-        <p:nvSpPr>
-          <p:cNvPr id="20" name="CuadroTexto 19">
-            <a:extLst>
-              <a:ext uri="{FF2B5EF4-FFF2-40B4-BE49-F238E27FC236}">
-                <a16:creationId xmlns:a16="http://schemas.microsoft.com/office/drawing/2014/main" id="{79EAB2BE-9BE1-4791-A3F1-B4D5F0FFE52E}"/>
+              <a:rPr lang="en-CA" sz="1600" dirty="0"/>
+              <a:t>UsrAdmin</a:t>
+            </a:r>
+            <a:endParaRPr lang="es-CO" sz="1600" dirty="0"/>
+          </a:p>
+        </p:txBody>
+      </p:sp>
+      <p:sp>
+        <p:nvSpPr>
+          <p:cNvPr id="31" name="CuadroTexto 30">
+            <a:extLst>
+              <a:ext uri="{FF2B5EF4-FFF2-40B4-BE49-F238E27FC236}">
+                <a16:creationId xmlns:a16="http://schemas.microsoft.com/office/drawing/2014/main" id="{3AFFC94C-585F-4B19-A719-8A47529549F5}"/>
               </a:ext>
             </a:extLst>
           </p:cNvPr>
@@ -3878,8 +4440,8 @@
         </p:nvSpPr>
         <p:spPr>
           <a:xfrm>
-            <a:off x="1426755" y="5000622"/>
-            <a:ext cx="4384962" cy="369332"/>
+            <a:off x="6214834" y="3895841"/>
+            <a:ext cx="2981617" cy="338554"/>
           </a:xfrm>
           <a:prstGeom prst="rect">
             <a:avLst/>
@@ -3893,19 +4455,19 @@
           <a:lstStyle/>
           <a:p>
             <a:r>
-              <a:rPr lang="en-CA" dirty="0"/>
-              <a:t>* * * * * * * * * * </a:t>
-            </a:r>
-            <a:endParaRPr lang="es-CO" dirty="0"/>
-          </a:p>
-        </p:txBody>
-      </p:sp>
-      <p:sp>
-        <p:nvSpPr>
-          <p:cNvPr id="21" name="Rectángulo 20">
-            <a:extLst>
-              <a:ext uri="{FF2B5EF4-FFF2-40B4-BE49-F238E27FC236}">
-                <a16:creationId xmlns:a16="http://schemas.microsoft.com/office/drawing/2014/main" id="{7F7EFB37-ECB9-4A87-93C1-DFA1CBAFE7CC}"/>
+              <a:rPr lang="en-CA" sz="1600" dirty="0"/>
+              <a:t>usradmin@atomhuron.com</a:t>
+            </a:r>
+            <a:endParaRPr lang="es-CO" sz="1600" dirty="0"/>
+          </a:p>
+        </p:txBody>
+      </p:sp>
+      <p:sp>
+        <p:nvSpPr>
+          <p:cNvPr id="34" name="Rectángulo 33">
+            <a:extLst>
+              <a:ext uri="{FF2B5EF4-FFF2-40B4-BE49-F238E27FC236}">
+                <a16:creationId xmlns:a16="http://schemas.microsoft.com/office/drawing/2014/main" id="{A914C837-28BC-414C-9412-AFC374F5A844}"/>
               </a:ext>
             </a:extLst>
           </p:cNvPr>
@@ -3914,16 +4476,69 @@
         </p:nvSpPr>
         <p:spPr>
           <a:xfrm>
-            <a:off x="1318846" y="3780711"/>
-            <a:ext cx="105508" cy="92329"/>
+            <a:off x="5692539" y="1143929"/>
+            <a:ext cx="4277710" cy="5013434"/>
           </a:xfrm>
           <a:prstGeom prst="rect">
             <a:avLst/>
           </a:prstGeom>
+          <a:noFill/>
+          <a:ln w="28575">
+            <a:solidFill>
+              <a:schemeClr val="accent1">
+                <a:lumMod val="50000"/>
+              </a:schemeClr>
+            </a:solidFill>
+          </a:ln>
+        </p:spPr>
+        <p:style>
+          <a:lnRef idx="2">
+            <a:schemeClr val="accent1">
+              <a:shade val="50000"/>
+            </a:schemeClr>
+          </a:lnRef>
+          <a:fillRef idx="1">
+            <a:schemeClr val="accent1"/>
+          </a:fillRef>
+          <a:effectRef idx="0">
+            <a:schemeClr val="accent1"/>
+          </a:effectRef>
+          <a:fontRef idx="minor">
+            <a:schemeClr val="lt1"/>
+          </a:fontRef>
+        </p:style>
+        <p:txBody>
+          <a:bodyPr rtlCol="0" anchor="ctr"/>
+          <a:lstStyle/>
+          <a:p>
+            <a:pPr algn="ctr"/>
+            <a:endParaRPr lang="es-CO"/>
+          </a:p>
+        </p:txBody>
+      </p:sp>
+      <p:sp>
+        <p:nvSpPr>
+          <p:cNvPr id="36" name="Rectángulo: esquinas redondeadas 35">
+            <a:extLst>
+              <a:ext uri="{FF2B5EF4-FFF2-40B4-BE49-F238E27FC236}">
+                <a16:creationId xmlns:a16="http://schemas.microsoft.com/office/drawing/2014/main" id="{B5F8DD72-54B5-4834-A26F-6DCD871F5EA0}"/>
+              </a:ext>
+            </a:extLst>
+          </p:cNvPr>
+          <p:cNvSpPr/>
+          <p:nvPr/>
+        </p:nvSpPr>
+        <p:spPr>
+          <a:xfrm>
+            <a:off x="8448900" y="4350411"/>
+            <a:ext cx="1025971" cy="364220"/>
+          </a:xfrm>
+          <a:prstGeom prst="roundRect">
+            <a:avLst/>
+          </a:prstGeom>
           <a:solidFill>
-            <a:schemeClr val="accent2">
-              <a:lumMod val="20000"/>
-              <a:lumOff val="80000"/>
+            <a:schemeClr val="accent1">
+              <a:lumMod val="50000"/>
             </a:schemeClr>
           </a:solidFill>
         </p:spPr>
@@ -3948,16 +4563,19 @@
           <a:lstStyle/>
           <a:p>
             <a:pPr algn="ctr"/>
-            <a:endParaRPr lang="es-CO" dirty="0"/>
-          </a:p>
-        </p:txBody>
-      </p:sp>
-      <p:sp>
-        <p:nvSpPr>
-          <p:cNvPr id="22" name="Rectángulo 21">
-            <a:extLst>
-              <a:ext uri="{FF2B5EF4-FFF2-40B4-BE49-F238E27FC236}">
-                <a16:creationId xmlns:a16="http://schemas.microsoft.com/office/drawing/2014/main" id="{66150BD1-FC05-4600-AB89-960723C729EE}"/>
+            <a:r>
+              <a:rPr lang="es-CO" sz="1600" dirty="0"/>
+              <a:t>Recordar</a:t>
+            </a:r>
+          </a:p>
+        </p:txBody>
+      </p:sp>
+      <p:sp>
+        <p:nvSpPr>
+          <p:cNvPr id="6" name="Rectángulo: esquinas redondeadas 5">
+            <a:extLst>
+              <a:ext uri="{FF2B5EF4-FFF2-40B4-BE49-F238E27FC236}">
+                <a16:creationId xmlns:a16="http://schemas.microsoft.com/office/drawing/2014/main" id="{B6A9C507-257D-45B6-BD5B-9DA7C9F6E11D}"/>
               </a:ext>
             </a:extLst>
           </p:cNvPr>
@@ -3966,18 +4584,24 @@
         </p:nvSpPr>
         <p:spPr>
           <a:xfrm>
-            <a:off x="1498753" y="3719135"/>
-            <a:ext cx="1981535" cy="232985"/>
+            <a:off x="178676" y="94593"/>
+            <a:ext cx="11908221" cy="584398"/>
           </a:xfrm>
-          <a:prstGeom prst="rect">
+          <a:prstGeom prst="roundRect">
             <a:avLst/>
           </a:prstGeom>
           <a:solidFill>
             <a:schemeClr val="accent1">
-              <a:lumMod val="40000"/>
-              <a:lumOff val="60000"/>
+              <a:lumMod val="50000"/>
             </a:schemeClr>
           </a:solidFill>
+          <a:ln>
+            <a:solidFill>
+              <a:schemeClr val="tx2">
+                <a:lumMod val="50000"/>
+              </a:schemeClr>
+            </a:solidFill>
+          </a:ln>
         </p:spPr>
         <p:style>
           <a:lnRef idx="2">
@@ -3999,69 +4623,18 @@
           <a:bodyPr rtlCol="0" anchor="ctr"/>
           <a:lstStyle/>
           <a:p>
-            <a:r>
-              <a:rPr lang="es-CO" dirty="0">
-                <a:solidFill>
-                  <a:schemeClr val="tx1"/>
-                </a:solidFill>
-                <a:latin typeface="Candara" panose="020E0502030303020204" pitchFamily="34" charset="0"/>
-              </a:rPr>
-              <a:t>Recordar Usuario</a:t>
-            </a:r>
-          </a:p>
-        </p:txBody>
-      </p:sp>
-      <p:sp>
-        <p:nvSpPr>
-          <p:cNvPr id="23" name="CuadroTexto 22">
-            <a:extLst>
-              <a:ext uri="{FF2B5EF4-FFF2-40B4-BE49-F238E27FC236}">
-                <a16:creationId xmlns:a16="http://schemas.microsoft.com/office/drawing/2014/main" id="{BFE6A604-762A-4600-B5AE-6CD1B79BA3F0}"/>
-              </a:ext>
-            </a:extLst>
-          </p:cNvPr>
-          <p:cNvSpPr txBox="1"/>
-          <p:nvPr/>
-        </p:nvSpPr>
-        <p:spPr>
-          <a:xfrm>
-            <a:off x="1082751" y="5598492"/>
-            <a:ext cx="3014464" cy="369332"/>
-          </a:xfrm>
-          <a:prstGeom prst="rect">
-            <a:avLst/>
-          </a:prstGeom>
-          <a:noFill/>
-        </p:spPr>
-        <p:txBody>
-          <a:bodyPr wrap="square" rtlCol="0">
-            <a:spAutoFit/>
-          </a:bodyPr>
-          <a:lstStyle/>
-          <a:p>
-            <a:r>
-              <a:rPr lang="en-US" u="sng" dirty="0">
-                <a:latin typeface="Candara" panose="020E0502030303020204" pitchFamily="34" charset="0"/>
-              </a:rPr>
-              <a:t>No </a:t>
-            </a:r>
-            <a:r>
-              <a:rPr lang="es-CO" u="sng" dirty="0">
-                <a:latin typeface="Candara" panose="020E0502030303020204" pitchFamily="34" charset="0"/>
-              </a:rPr>
-              <a:t>Recuerda</a:t>
-            </a:r>
-            <a:r>
-              <a:rPr lang="en-US" u="sng" dirty="0">
-                <a:latin typeface="Candara" panose="020E0502030303020204" pitchFamily="34" charset="0"/>
-              </a:rPr>
-              <a:t> La </a:t>
-            </a:r>
-            <a:r>
-              <a:rPr lang="es-CO" u="sng" dirty="0">
-                <a:latin typeface="Candara" panose="020E0502030303020204" pitchFamily="34" charset="0"/>
-              </a:rPr>
-              <a:t>Contraseña</a:t>
+            <a:pPr algn="ctr"/>
+            <a:r>
+              <a:rPr lang="es-CO" dirty="0"/>
+              <a:t>Navegación e interfaces </a:t>
+            </a:r>
+            <a:r>
+              <a:rPr lang="es-CO" dirty="0" err="1"/>
+              <a:t>Atom</a:t>
+            </a:r>
+            <a:r>
+              <a:rPr lang="es-CO" dirty="0"/>
+              <a:t>-Huron</a:t>
             </a:r>
           </a:p>
         </p:txBody>

</xml_diff>